<commit_message>
complete presentation for introduction
</commit_message>
<xml_diff>
--- a/doc/fab_school_intro/zuev_braille_2019.pptx
+++ b/doc/fab_school_intro/zuev_braille_2019.pptx
@@ -10,7 +10,7 @@
     <p:sldId id="258" r:id="rId4"/>
     <p:sldId id="259" r:id="rId5"/>
     <p:sldId id="262" r:id="rId6"/>
-    <p:sldId id="263" r:id="rId7"/>
+    <p:sldId id="264" r:id="rId7"/>
   </p:sldIdLst>
   <p:sldSz cx="12192000" cy="6858000"/>
   <p:notesSz cx="6858000" cy="9144000"/>
@@ -109,6 +109,11 @@
       </a:defRPr>
     </a:lvl9pPr>
   </p:defaultTextStyle>
+  <p:extLst>
+    <p:ext uri="{EFAFB233-063F-42B5-8137-9DF3F51BA10A}">
+      <p15:sldGuideLst xmlns:p15="http://schemas.microsoft.com/office/powerpoint/2012/main"/>
+    </p:ext>
+  </p:extLst>
 </p:presentation>
 </file>
 
@@ -4537,7 +4542,7 @@
                                   <p:childTnLst>
                                     <p:cmd type="call" cmd="playFrom(0.0)">
                                       <p:cBhvr>
-                                        <p:cTn id="6" dur="1" fill="hold"/>
+                                        <p:cTn id="6" dur="7361" fill="hold"/>
                                         <p:tgtEl>
                                           <p:spTgt spid="8"/>
                                         </p:tgtEl>
@@ -4650,6 +4655,14 @@
 <file path=ppt/slides/slide6.xml><?xml version="1.0" encoding="utf-8"?>
 <p:sld xmlns:a="http://schemas.openxmlformats.org/drawingml/2006/main" xmlns:r="http://schemas.openxmlformats.org/officeDocument/2006/relationships" xmlns:p="http://schemas.openxmlformats.org/presentationml/2006/main">
   <p:cSld>
+    <p:bg>
+      <p:bgPr>
+        <a:solidFill>
+          <a:srgbClr val="FFFFFF"/>
+        </a:solidFill>
+        <a:effectLst/>
+      </p:bgPr>
+    </p:bg>
     <p:spTree>
       <p:nvGrpSpPr>
         <p:cNvPr id="1" name=""/>
@@ -4664,12 +4677,110 @@
           <a:chExt cx="0" cy="0"/>
         </a:xfrm>
       </p:grpSpPr>
+      <p:pic>
+        <p:nvPicPr>
+          <p:cNvPr id="8" name="Объект 4">
+            <a:extLst>
+              <a:ext uri="{FF2B5EF4-FFF2-40B4-BE49-F238E27FC236}">
+                <a16:creationId xmlns:a16="http://schemas.microsoft.com/office/drawing/2014/main" id="{863A2594-4B85-49E5-95D3-1343177B3FC8}"/>
+              </a:ext>
+            </a:extLst>
+          </p:cNvPr>
+          <p:cNvPicPr>
+            <a:picLocks noChangeAspect="1"/>
+          </p:cNvPicPr>
+          <p:nvPr/>
+        </p:nvPicPr>
+        <p:blipFill rotWithShape="1">
+          <a:blip r:embed="rId2">
+            <a:extLst>
+              <a:ext uri="{28A0092B-C50C-407E-A947-70E740481C1C}">
+                <a14:useLocalDpi xmlns:a14="http://schemas.microsoft.com/office/drawing/2010/main" val="0"/>
+              </a:ext>
+            </a:extLst>
+          </a:blip>
+          <a:srcRect r="11555" b="-1"/>
+          <a:stretch/>
+        </p:blipFill>
+        <p:spPr>
+          <a:xfrm>
+            <a:off x="-538760" y="-1360870"/>
+            <a:ext cx="12730760" cy="6600722"/>
+          </a:xfrm>
+          <a:prstGeom prst="rect">
+            <a:avLst/>
+          </a:prstGeom>
+        </p:spPr>
+      </p:pic>
+      <p:sp>
+        <p:nvSpPr>
+          <p:cNvPr id="30" name="Rectangle 29">
+            <a:extLst>
+              <a:ext uri="{FF2B5EF4-FFF2-40B4-BE49-F238E27FC236}">
+                <a16:creationId xmlns:a16="http://schemas.microsoft.com/office/drawing/2014/main" id="{72257994-BD97-4691-8B89-198A6D2BABDC}"/>
+              </a:ext>
+              <a:ext uri="{C183D7F6-B498-43B3-948B-1728B52AA6E4}">
+                <adec:decorative xmlns:adec="http://schemas.microsoft.com/office/drawing/2017/decorative" val="1"/>
+              </a:ext>
+            </a:extLst>
+          </p:cNvPr>
+          <p:cNvSpPr>
+            <a:spLocks noGrp="1" noRot="1" noChangeAspect="1" noMove="1" noResize="1" noEditPoints="1" noAdjustHandles="1" noChangeArrowheads="1" noChangeShapeType="1" noTextEdit="1"/>
+          </p:cNvSpPr>
+          <p:nvPr>
+            <p:extLst>
+              <p:ext uri="{386F3935-93C4-4BCD-93E2-E3B085C9AB24}">
+                <p16:designElem xmlns:p16="http://schemas.microsoft.com/office/powerpoint/2015/main" val="1"/>
+              </p:ext>
+            </p:extLst>
+          </p:nvPr>
+        </p:nvSpPr>
+        <p:spPr>
+          <a:xfrm>
+            <a:off x="0" y="4918509"/>
+            <a:ext cx="12192000" cy="1939491"/>
+          </a:xfrm>
+          <a:prstGeom prst="rect">
+            <a:avLst/>
+          </a:prstGeom>
+          <a:solidFill>
+            <a:srgbClr val="404040"/>
+          </a:solidFill>
+          <a:ln>
+            <a:noFill/>
+          </a:ln>
+        </p:spPr>
+        <p:style>
+          <a:lnRef idx="2">
+            <a:schemeClr val="accent1">
+              <a:shade val="50000"/>
+            </a:schemeClr>
+          </a:lnRef>
+          <a:fillRef idx="1">
+            <a:schemeClr val="accent1"/>
+          </a:fillRef>
+          <a:effectRef idx="0">
+            <a:schemeClr val="accent1"/>
+          </a:effectRef>
+          <a:fontRef idx="minor">
+            <a:schemeClr val="lt1"/>
+          </a:fontRef>
+        </p:style>
+        <p:txBody>
+          <a:bodyPr rtlCol="0" anchor="ctr"/>
+          <a:lstStyle/>
+          <a:p>
+            <a:pPr algn="ctr"/>
+            <a:endParaRPr lang="en-US"/>
+          </a:p>
+        </p:txBody>
+      </p:sp>
       <p:sp>
         <p:nvSpPr>
           <p:cNvPr id="2" name="Заголовок 1">
             <a:extLst>
               <a:ext uri="{FF2B5EF4-FFF2-40B4-BE49-F238E27FC236}">
-                <a16:creationId xmlns:a16="http://schemas.microsoft.com/office/drawing/2014/main" id="{9186F7E1-128F-47E2-B493-42A2A64E26E6}"/>
+                <a16:creationId xmlns:a16="http://schemas.microsoft.com/office/drawing/2014/main" id="{6BFAAB15-6A9E-4AF9-A00E-73D0E65AFD2E}"/>
               </a:ext>
             </a:extLst>
           </p:cNvPr>
@@ -4680,44 +4791,48 @@
             <p:ph type="title"/>
           </p:nvPr>
         </p:nvSpPr>
-        <p:spPr/>
-        <p:txBody>
-          <a:bodyPr/>
-          <a:lstStyle/>
-          <a:p>
-            <a:endParaRPr lang="ru-RU"/>
-          </a:p>
-        </p:txBody>
-      </p:sp>
-      <p:sp>
-        <p:nvSpPr>
-          <p:cNvPr id="3" name="Объект 2">
-            <a:extLst>
-              <a:ext uri="{FF2B5EF4-FFF2-40B4-BE49-F238E27FC236}">
-                <a16:creationId xmlns:a16="http://schemas.microsoft.com/office/drawing/2014/main" id="{325DE7A4-EC5B-4620-984C-5B21D4CDE8A2}"/>
-              </a:ext>
-            </a:extLst>
-          </p:cNvPr>
-          <p:cNvSpPr>
-            <a:spLocks noGrp="1"/>
-          </p:cNvSpPr>
-          <p:nvPr>
-            <p:ph idx="1"/>
-          </p:nvPr>
-        </p:nvSpPr>
-        <p:spPr/>
-        <p:txBody>
-          <a:bodyPr/>
-          <a:lstStyle/>
-          <a:p>
-            <a:endParaRPr lang="ru-RU"/>
+        <p:spPr>
+          <a:xfrm>
+            <a:off x="1600200" y="4269282"/>
+            <a:ext cx="8991600" cy="1264762"/>
+          </a:xfrm>
+          <a:solidFill>
+            <a:srgbClr val="FFFFFF"/>
+          </a:solidFill>
+          <a:ln w="38100">
+            <a:solidFill>
+              <a:srgbClr val="404040"/>
+            </a:solidFill>
+            <a:miter lim="800000"/>
+          </a:ln>
+        </p:spPr>
+        <p:txBody>
+          <a:bodyPr vert="horz" lIns="91440" tIns="45720" rIns="91440" bIns="45720" rtlCol="0" anchor="ctr">
+            <a:normAutofit/>
+          </a:bodyPr>
+          <a:lstStyle/>
+          <a:p>
+            <a:pPr algn="ctr"/>
+            <a:r>
+              <a:rPr lang="ru-RU" sz="4000" dirty="0">
+                <a:solidFill>
+                  <a:srgbClr val="404040"/>
+                </a:solidFill>
+              </a:rPr>
+              <a:t>Модель нового тренажёра</a:t>
+            </a:r>
+            <a:endParaRPr lang="en-US" sz="4000" dirty="0">
+              <a:solidFill>
+                <a:srgbClr val="404040"/>
+              </a:solidFill>
+            </a:endParaRPr>
           </a:p>
         </p:txBody>
       </p:sp>
     </p:spTree>
     <p:extLst>
       <p:ext uri="{BB962C8B-B14F-4D97-AF65-F5344CB8AC3E}">
-        <p14:creationId xmlns:p14="http://schemas.microsoft.com/office/powerpoint/2010/main" val="1022770569"/>
+        <p14:creationId xmlns:p14="http://schemas.microsoft.com/office/powerpoint/2010/main" val="1297468866"/>
       </p:ext>
     </p:extLst>
   </p:cSld>

</xml_diff>

<commit_message>
modify sides, make dxf
</commit_message>
<xml_diff>
--- a/doc/fab_school_intro/zuev_braille_2019.pptx
+++ b/doc/fab_school_intro/zuev_braille_2019.pptx
@@ -264,7 +264,7 @@
           <a:p>
             <a:fld id="{C7C45028-CA10-4071-A728-606288E9772B}" type="datetimeFigureOut">
               <a:rPr lang="ru-RU" smtClean="0"/>
-              <a:t>03.02.2019</a:t>
+              <a:t>04.02.2019</a:t>
             </a:fld>
             <a:endParaRPr lang="ru-RU"/>
           </a:p>
@@ -462,7 +462,7 @@
           <a:p>
             <a:fld id="{C7C45028-CA10-4071-A728-606288E9772B}" type="datetimeFigureOut">
               <a:rPr lang="ru-RU" smtClean="0"/>
-              <a:t>03.02.2019</a:t>
+              <a:t>04.02.2019</a:t>
             </a:fld>
             <a:endParaRPr lang="ru-RU"/>
           </a:p>
@@ -670,7 +670,7 @@
           <a:p>
             <a:fld id="{C7C45028-CA10-4071-A728-606288E9772B}" type="datetimeFigureOut">
               <a:rPr lang="ru-RU" smtClean="0"/>
-              <a:t>03.02.2019</a:t>
+              <a:t>04.02.2019</a:t>
             </a:fld>
             <a:endParaRPr lang="ru-RU"/>
           </a:p>
@@ -868,7 +868,7 @@
           <a:p>
             <a:fld id="{C7C45028-CA10-4071-A728-606288E9772B}" type="datetimeFigureOut">
               <a:rPr lang="ru-RU" smtClean="0"/>
-              <a:t>03.02.2019</a:t>
+              <a:t>04.02.2019</a:t>
             </a:fld>
             <a:endParaRPr lang="ru-RU"/>
           </a:p>
@@ -1143,7 +1143,7 @@
           <a:p>
             <a:fld id="{C7C45028-CA10-4071-A728-606288E9772B}" type="datetimeFigureOut">
               <a:rPr lang="ru-RU" smtClean="0"/>
-              <a:t>03.02.2019</a:t>
+              <a:t>04.02.2019</a:t>
             </a:fld>
             <a:endParaRPr lang="ru-RU"/>
           </a:p>
@@ -1408,7 +1408,7 @@
           <a:p>
             <a:fld id="{C7C45028-CA10-4071-A728-606288E9772B}" type="datetimeFigureOut">
               <a:rPr lang="ru-RU" smtClean="0"/>
-              <a:t>03.02.2019</a:t>
+              <a:t>04.02.2019</a:t>
             </a:fld>
             <a:endParaRPr lang="ru-RU"/>
           </a:p>
@@ -1820,7 +1820,7 @@
           <a:p>
             <a:fld id="{C7C45028-CA10-4071-A728-606288E9772B}" type="datetimeFigureOut">
               <a:rPr lang="ru-RU" smtClean="0"/>
-              <a:t>03.02.2019</a:t>
+              <a:t>04.02.2019</a:t>
             </a:fld>
             <a:endParaRPr lang="ru-RU"/>
           </a:p>
@@ -1961,7 +1961,7 @@
           <a:p>
             <a:fld id="{C7C45028-CA10-4071-A728-606288E9772B}" type="datetimeFigureOut">
               <a:rPr lang="ru-RU" smtClean="0"/>
-              <a:t>03.02.2019</a:t>
+              <a:t>04.02.2019</a:t>
             </a:fld>
             <a:endParaRPr lang="ru-RU"/>
           </a:p>
@@ -2074,7 +2074,7 @@
           <a:p>
             <a:fld id="{C7C45028-CA10-4071-A728-606288E9772B}" type="datetimeFigureOut">
               <a:rPr lang="ru-RU" smtClean="0"/>
-              <a:t>03.02.2019</a:t>
+              <a:t>04.02.2019</a:t>
             </a:fld>
             <a:endParaRPr lang="ru-RU"/>
           </a:p>
@@ -2385,7 +2385,7 @@
           <a:p>
             <a:fld id="{C7C45028-CA10-4071-A728-606288E9772B}" type="datetimeFigureOut">
               <a:rPr lang="ru-RU" smtClean="0"/>
-              <a:t>03.02.2019</a:t>
+              <a:t>04.02.2019</a:t>
             </a:fld>
             <a:endParaRPr lang="ru-RU"/>
           </a:p>
@@ -2673,7 +2673,7 @@
           <a:p>
             <a:fld id="{C7C45028-CA10-4071-A728-606288E9772B}" type="datetimeFigureOut">
               <a:rPr lang="ru-RU" smtClean="0"/>
-              <a:t>03.02.2019</a:t>
+              <a:t>04.02.2019</a:t>
             </a:fld>
             <a:endParaRPr lang="ru-RU"/>
           </a:p>
@@ -2914,7 +2914,7 @@
           <a:p>
             <a:fld id="{C7C45028-CA10-4071-A728-606288E9772B}" type="datetimeFigureOut">
               <a:rPr lang="ru-RU" smtClean="0"/>
-              <a:t>03.02.2019</a:t>
+              <a:t>04.02.2019</a:t>
             </a:fld>
             <a:endParaRPr lang="ru-RU"/>
           </a:p>
@@ -3317,6 +3317,14 @@
 <file path=ppt/slides/slide1.xml><?xml version="1.0" encoding="utf-8"?>
 <p:sld xmlns:a="http://schemas.openxmlformats.org/drawingml/2006/main" xmlns:r="http://schemas.openxmlformats.org/officeDocument/2006/relationships" xmlns:p="http://schemas.openxmlformats.org/presentationml/2006/main">
   <p:cSld>
+    <p:bg>
+      <p:bgPr>
+        <a:solidFill>
+          <a:schemeClr val="bg2"/>
+        </a:solidFill>
+        <a:effectLst/>
+      </p:bgPr>
+    </p:bg>
     <p:spTree>
       <p:nvGrpSpPr>
         <p:cNvPr id="1" name=""/>
@@ -3360,7 +3368,7 @@
           <a:lstStyle/>
           <a:p>
             <a:r>
-              <a:rPr lang="ru-RU" sz="4800">
+              <a:rPr lang="ru-RU" sz="4800" dirty="0">
                 <a:effectLst/>
               </a:rPr>
               <a:t>Устройство для обучения незрячих чтению рельефным шрифтом «Тренажёр Брайля»</a:t>

</xml_diff>